<commit_message>
Cover images, schedule, etc. (Share)
</commit_message>
<xml_diff>
--- a/public/data/_work-in-progress/_share/cover-images.pptx
+++ b/public/data/_work-in-progress/_share/cover-images.pptx
@@ -285,7 +285,7 @@
           <a:p>
             <a:fld id="{F8790B07-F0DA-42FB-9B41-9B73EF6DB6A9}" type="datetimeFigureOut">
               <a:rPr lang="en-US" smtClean="0"/>
-              <a:t>1/2/2025</a:t>
+              <a:t>1/20/2025</a:t>
             </a:fld>
             <a:endParaRPr lang="en-US"/>
           </a:p>
@@ -483,7 +483,7 @@
           <a:p>
             <a:fld id="{F8790B07-F0DA-42FB-9B41-9B73EF6DB6A9}" type="datetimeFigureOut">
               <a:rPr lang="en-US" smtClean="0"/>
-              <a:t>1/2/2025</a:t>
+              <a:t>1/20/2025</a:t>
             </a:fld>
             <a:endParaRPr lang="en-US"/>
           </a:p>
@@ -691,7 +691,7 @@
           <a:p>
             <a:fld id="{F8790B07-F0DA-42FB-9B41-9B73EF6DB6A9}" type="datetimeFigureOut">
               <a:rPr lang="en-US" smtClean="0"/>
-              <a:t>1/2/2025</a:t>
+              <a:t>1/20/2025</a:t>
             </a:fld>
             <a:endParaRPr lang="en-US"/>
           </a:p>
@@ -889,7 +889,7 @@
           <a:p>
             <a:fld id="{F8790B07-F0DA-42FB-9B41-9B73EF6DB6A9}" type="datetimeFigureOut">
               <a:rPr lang="en-US" smtClean="0"/>
-              <a:t>1/2/2025</a:t>
+              <a:t>1/20/2025</a:t>
             </a:fld>
             <a:endParaRPr lang="en-US"/>
           </a:p>
@@ -1164,7 +1164,7 @@
           <a:p>
             <a:fld id="{F8790B07-F0DA-42FB-9B41-9B73EF6DB6A9}" type="datetimeFigureOut">
               <a:rPr lang="en-US" smtClean="0"/>
-              <a:t>1/2/2025</a:t>
+              <a:t>1/20/2025</a:t>
             </a:fld>
             <a:endParaRPr lang="en-US"/>
           </a:p>
@@ -1429,7 +1429,7 @@
           <a:p>
             <a:fld id="{F8790B07-F0DA-42FB-9B41-9B73EF6DB6A9}" type="datetimeFigureOut">
               <a:rPr lang="en-US" smtClean="0"/>
-              <a:t>1/2/2025</a:t>
+              <a:t>1/20/2025</a:t>
             </a:fld>
             <a:endParaRPr lang="en-US"/>
           </a:p>
@@ -1841,7 +1841,7 @@
           <a:p>
             <a:fld id="{F8790B07-F0DA-42FB-9B41-9B73EF6DB6A9}" type="datetimeFigureOut">
               <a:rPr lang="en-US" smtClean="0"/>
-              <a:t>1/2/2025</a:t>
+              <a:t>1/20/2025</a:t>
             </a:fld>
             <a:endParaRPr lang="en-US"/>
           </a:p>
@@ -1982,7 +1982,7 @@
           <a:p>
             <a:fld id="{F8790B07-F0DA-42FB-9B41-9B73EF6DB6A9}" type="datetimeFigureOut">
               <a:rPr lang="en-US" smtClean="0"/>
-              <a:t>1/2/2025</a:t>
+              <a:t>1/20/2025</a:t>
             </a:fld>
             <a:endParaRPr lang="en-US"/>
           </a:p>
@@ -2095,7 +2095,7 @@
           <a:p>
             <a:fld id="{F8790B07-F0DA-42FB-9B41-9B73EF6DB6A9}" type="datetimeFigureOut">
               <a:rPr lang="en-US" smtClean="0"/>
-              <a:t>1/2/2025</a:t>
+              <a:t>1/20/2025</a:t>
             </a:fld>
             <a:endParaRPr lang="en-US"/>
           </a:p>
@@ -2406,7 +2406,7 @@
           <a:p>
             <a:fld id="{F8790B07-F0DA-42FB-9B41-9B73EF6DB6A9}" type="datetimeFigureOut">
               <a:rPr lang="en-US" smtClean="0"/>
-              <a:t>1/2/2025</a:t>
+              <a:t>1/20/2025</a:t>
             </a:fld>
             <a:endParaRPr lang="en-US"/>
           </a:p>
@@ -2694,7 +2694,7 @@
           <a:p>
             <a:fld id="{F8790B07-F0DA-42FB-9B41-9B73EF6DB6A9}" type="datetimeFigureOut">
               <a:rPr lang="en-US" smtClean="0"/>
-              <a:t>1/2/2025</a:t>
+              <a:t>1/20/2025</a:t>
             </a:fld>
             <a:endParaRPr lang="en-US"/>
           </a:p>
@@ -2935,7 +2935,7 @@
           <a:p>
             <a:fld id="{F8790B07-F0DA-42FB-9B41-9B73EF6DB6A9}" type="datetimeFigureOut">
               <a:rPr lang="en-US" smtClean="0"/>
-              <a:t>1/2/2025</a:t>
+              <a:t>1/20/2025</a:t>
             </a:fld>
             <a:endParaRPr lang="en-US"/>
           </a:p>
@@ -6642,61 +6642,41 @@
           <a:chExt cx="0" cy="0"/>
         </a:xfrm>
       </p:grpSpPr>
-      <p:sp>
-        <p:nvSpPr>
-          <p:cNvPr id="40" name="Image">
-            <a:extLst>
-              <a:ext uri="{FF2B5EF4-FFF2-40B4-BE49-F238E27FC236}">
-                <a16:creationId xmlns:a16="http://schemas.microsoft.com/office/drawing/2014/main" id="{07E73592-5E3F-3D42-611E-1B0EF3B6332D}"/>
-              </a:ext>
-            </a:extLst>
-          </p:cNvPr>
-          <p:cNvSpPr/>
+      <p:pic>
+        <p:nvPicPr>
+          <p:cNvPr id="13" name="Picture 12">
+            <a:extLst>
+              <a:ext uri="{FF2B5EF4-FFF2-40B4-BE49-F238E27FC236}">
+                <a16:creationId xmlns:a16="http://schemas.microsoft.com/office/drawing/2014/main" id="{0E18ABAF-DD3C-6D0F-4965-22C6AC79C87E}"/>
+              </a:ext>
+            </a:extLst>
+          </p:cNvPr>
+          <p:cNvPicPr>
+            <a:picLocks noChangeAspect="1"/>
+          </p:cNvPicPr>
           <p:nvPr/>
-        </p:nvSpPr>
+        </p:nvPicPr>
+        <p:blipFill>
+          <a:blip r:embed="rId2">
+            <a:extLst>
+              <a:ext uri="{28A0092B-C50C-407E-A947-70E740481C1C}">
+                <a14:useLocalDpi xmlns:a14="http://schemas.microsoft.com/office/drawing/2010/main" val="0"/>
+              </a:ext>
+            </a:extLst>
+          </a:blip>
+          <a:srcRect l="15147" t="1069" r="21728" b="2043"/>
+          <a:stretch/>
+        </p:blipFill>
         <p:spPr>
           <a:xfrm>
-            <a:off x="397476" y="337289"/>
-            <a:ext cx="4991146" cy="4991146"/>
+            <a:off x="517170" y="359585"/>
+            <a:ext cx="4810065" cy="4891145"/>
           </a:xfrm>
           <a:prstGeom prst="rect">
             <a:avLst/>
           </a:prstGeom>
-          <a:blipFill>
-            <a:blip r:embed="rId2"/>
-            <a:stretch>
-              <a:fillRect/>
-            </a:stretch>
-          </a:blipFill>
-          <a:ln>
-            <a:noFill/>
-          </a:ln>
         </p:spPr>
-        <p:style>
-          <a:lnRef idx="2">
-            <a:schemeClr val="accent6">
-              <a:shade val="15000"/>
-            </a:schemeClr>
-          </a:lnRef>
-          <a:fillRef idx="1">
-            <a:schemeClr val="accent6"/>
-          </a:fillRef>
-          <a:effectRef idx="0">
-            <a:schemeClr val="accent6"/>
-          </a:effectRef>
-          <a:fontRef idx="minor">
-            <a:schemeClr val="lt1"/>
-          </a:fontRef>
-        </p:style>
-        <p:txBody>
-          <a:bodyPr rtlCol="0" anchor="ctr"/>
-          <a:lstStyle/>
-          <a:p>
-            <a:pPr algn="ctr"/>
-            <a:endParaRPr lang="en-US"/>
-          </a:p>
-        </p:txBody>
-      </p:sp>
+      </p:pic>
       <p:sp>
         <p:nvSpPr>
           <p:cNvPr id="3" name="gradient">
@@ -7153,61 +7133,41 @@
           <a:chExt cx="0" cy="0"/>
         </a:xfrm>
       </p:grpSpPr>
-      <p:sp>
-        <p:nvSpPr>
-          <p:cNvPr id="40" name="Image">
-            <a:extLst>
-              <a:ext uri="{FF2B5EF4-FFF2-40B4-BE49-F238E27FC236}">
-                <a16:creationId xmlns:a16="http://schemas.microsoft.com/office/drawing/2014/main" id="{6B6D811B-D247-7406-09C2-FD8A4E97B30F}"/>
-              </a:ext>
-            </a:extLst>
-          </p:cNvPr>
-          <p:cNvSpPr/>
+      <p:pic>
+        <p:nvPicPr>
+          <p:cNvPr id="9" name="Picture 8">
+            <a:extLst>
+              <a:ext uri="{FF2B5EF4-FFF2-40B4-BE49-F238E27FC236}">
+                <a16:creationId xmlns:a16="http://schemas.microsoft.com/office/drawing/2014/main" id="{0F4863AC-4775-3135-74F0-22514C6140CE}"/>
+              </a:ext>
+            </a:extLst>
+          </p:cNvPr>
+          <p:cNvPicPr>
+            <a:picLocks noChangeAspect="1"/>
+          </p:cNvPicPr>
           <p:nvPr/>
-        </p:nvSpPr>
+        </p:nvPicPr>
+        <p:blipFill>
+          <a:blip r:embed="rId2">
+            <a:extLst>
+              <a:ext uri="{28A0092B-C50C-407E-A947-70E740481C1C}">
+                <a14:useLocalDpi xmlns:a14="http://schemas.microsoft.com/office/drawing/2010/main" val="0"/>
+              </a:ext>
+            </a:extLst>
+          </a:blip>
+          <a:srcRect l="34974" t="1510" r="819" b="1543"/>
+          <a:stretch/>
+        </p:blipFill>
         <p:spPr>
           <a:xfrm>
-            <a:off x="397476" y="337289"/>
-            <a:ext cx="4991146" cy="4991146"/>
+            <a:off x="517170" y="409574"/>
+            <a:ext cx="4810065" cy="4838701"/>
           </a:xfrm>
           <a:prstGeom prst="rect">
             <a:avLst/>
           </a:prstGeom>
-          <a:blipFill>
-            <a:blip r:embed="rId2"/>
-            <a:stretch>
-              <a:fillRect/>
-            </a:stretch>
-          </a:blipFill>
-          <a:ln>
-            <a:noFill/>
-          </a:ln>
         </p:spPr>
-        <p:style>
-          <a:lnRef idx="2">
-            <a:schemeClr val="accent6">
-              <a:shade val="15000"/>
-            </a:schemeClr>
-          </a:lnRef>
-          <a:fillRef idx="1">
-            <a:schemeClr val="accent6"/>
-          </a:fillRef>
-          <a:effectRef idx="0">
-            <a:schemeClr val="accent6"/>
-          </a:effectRef>
-          <a:fontRef idx="minor">
-            <a:schemeClr val="lt1"/>
-          </a:fontRef>
-        </p:style>
-        <p:txBody>
-          <a:bodyPr rtlCol="0" anchor="ctr"/>
-          <a:lstStyle/>
-          <a:p>
-            <a:pPr algn="ctr"/>
-            <a:endParaRPr lang="en-US"/>
-          </a:p>
-        </p:txBody>
-      </p:sp>
+      </p:pic>
       <p:sp>
         <p:nvSpPr>
           <p:cNvPr id="3" name="gradient">

</xml_diff>

<commit_message>
Update more export imgs
</commit_message>
<xml_diff>
--- a/public/data/_work-in-progress/_share/cover-images.pptx
+++ b/public/data/_work-in-progress/_share/cover-images.pptx
@@ -32,6 +32,7 @@
     <p:sldId id="280" r:id="rId26"/>
     <p:sldId id="281" r:id="rId27"/>
     <p:sldId id="282" r:id="rId28"/>
+    <p:sldId id="283" r:id="rId29"/>
   </p:sldIdLst>
   <p:sldSz cx="12192000" cy="6858000"/>
   <p:notesSz cx="6858000" cy="9144000"/>
@@ -285,7 +286,7 @@
           <a:p>
             <a:fld id="{F8790B07-F0DA-42FB-9B41-9B73EF6DB6A9}" type="datetimeFigureOut">
               <a:rPr lang="en-US" smtClean="0"/>
-              <a:t>2/28/2025</a:t>
+              <a:t>3/19/2025</a:t>
             </a:fld>
             <a:endParaRPr lang="en-US"/>
           </a:p>
@@ -483,7 +484,7 @@
           <a:p>
             <a:fld id="{F8790B07-F0DA-42FB-9B41-9B73EF6DB6A9}" type="datetimeFigureOut">
               <a:rPr lang="en-US" smtClean="0"/>
-              <a:t>2/28/2025</a:t>
+              <a:t>3/19/2025</a:t>
             </a:fld>
             <a:endParaRPr lang="en-US"/>
           </a:p>
@@ -691,7 +692,7 @@
           <a:p>
             <a:fld id="{F8790B07-F0DA-42FB-9B41-9B73EF6DB6A9}" type="datetimeFigureOut">
               <a:rPr lang="en-US" smtClean="0"/>
-              <a:t>2/28/2025</a:t>
+              <a:t>3/19/2025</a:t>
             </a:fld>
             <a:endParaRPr lang="en-US"/>
           </a:p>
@@ -889,7 +890,7 @@
           <a:p>
             <a:fld id="{F8790B07-F0DA-42FB-9B41-9B73EF6DB6A9}" type="datetimeFigureOut">
               <a:rPr lang="en-US" smtClean="0"/>
-              <a:t>2/28/2025</a:t>
+              <a:t>3/19/2025</a:t>
             </a:fld>
             <a:endParaRPr lang="en-US"/>
           </a:p>
@@ -1164,7 +1165,7 @@
           <a:p>
             <a:fld id="{F8790B07-F0DA-42FB-9B41-9B73EF6DB6A9}" type="datetimeFigureOut">
               <a:rPr lang="en-US" smtClean="0"/>
-              <a:t>2/28/2025</a:t>
+              <a:t>3/19/2025</a:t>
             </a:fld>
             <a:endParaRPr lang="en-US"/>
           </a:p>
@@ -1429,7 +1430,7 @@
           <a:p>
             <a:fld id="{F8790B07-F0DA-42FB-9B41-9B73EF6DB6A9}" type="datetimeFigureOut">
               <a:rPr lang="en-US" smtClean="0"/>
-              <a:t>2/28/2025</a:t>
+              <a:t>3/19/2025</a:t>
             </a:fld>
             <a:endParaRPr lang="en-US"/>
           </a:p>
@@ -1841,7 +1842,7 @@
           <a:p>
             <a:fld id="{F8790B07-F0DA-42FB-9B41-9B73EF6DB6A9}" type="datetimeFigureOut">
               <a:rPr lang="en-US" smtClean="0"/>
-              <a:t>2/28/2025</a:t>
+              <a:t>3/19/2025</a:t>
             </a:fld>
             <a:endParaRPr lang="en-US"/>
           </a:p>
@@ -1982,7 +1983,7 @@
           <a:p>
             <a:fld id="{F8790B07-F0DA-42FB-9B41-9B73EF6DB6A9}" type="datetimeFigureOut">
               <a:rPr lang="en-US" smtClean="0"/>
-              <a:t>2/28/2025</a:t>
+              <a:t>3/19/2025</a:t>
             </a:fld>
             <a:endParaRPr lang="en-US"/>
           </a:p>
@@ -2095,7 +2096,7 @@
           <a:p>
             <a:fld id="{F8790B07-F0DA-42FB-9B41-9B73EF6DB6A9}" type="datetimeFigureOut">
               <a:rPr lang="en-US" smtClean="0"/>
-              <a:t>2/28/2025</a:t>
+              <a:t>3/19/2025</a:t>
             </a:fld>
             <a:endParaRPr lang="en-US"/>
           </a:p>
@@ -2406,7 +2407,7 @@
           <a:p>
             <a:fld id="{F8790B07-F0DA-42FB-9B41-9B73EF6DB6A9}" type="datetimeFigureOut">
               <a:rPr lang="en-US" smtClean="0"/>
-              <a:t>2/28/2025</a:t>
+              <a:t>3/19/2025</a:t>
             </a:fld>
             <a:endParaRPr lang="en-US"/>
           </a:p>
@@ -2694,7 +2695,7 @@
           <a:p>
             <a:fld id="{F8790B07-F0DA-42FB-9B41-9B73EF6DB6A9}" type="datetimeFigureOut">
               <a:rPr lang="en-US" smtClean="0"/>
-              <a:t>2/28/2025</a:t>
+              <a:t>3/19/2025</a:t>
             </a:fld>
             <a:endParaRPr lang="en-US"/>
           </a:p>
@@ -2935,7 +2936,7 @@
           <a:p>
             <a:fld id="{F8790B07-F0DA-42FB-9B41-9B73EF6DB6A9}" type="datetimeFigureOut">
               <a:rPr lang="en-US" smtClean="0"/>
-              <a:t>2/28/2025</a:t>
+              <a:t>3/19/2025</a:t>
             </a:fld>
             <a:endParaRPr lang="en-US"/>
           </a:p>
@@ -11016,7 +11017,13 @@
             <a:avLst/>
           </a:prstGeom>
           <a:blipFill>
-            <a:blip r:embed="rId2"/>
+            <a:blip r:embed="rId2">
+              <a:extLst>
+                <a:ext uri="{28A0092B-C50C-407E-A947-70E740481C1C}">
+                  <a14:useLocalDpi xmlns:a14="http://schemas.microsoft.com/office/drawing/2010/main" val="0"/>
+                </a:ext>
+              </a:extLst>
+            </a:blip>
             <a:stretch>
               <a:fillRect/>
             </a:stretch>
@@ -11579,7 +11586,13 @@
             <a:avLst/>
           </a:prstGeom>
           <a:blipFill>
-            <a:blip r:embed="rId2"/>
+            <a:blip r:embed="rId2">
+              <a:extLst>
+                <a:ext uri="{28A0092B-C50C-407E-A947-70E740481C1C}">
+                  <a14:useLocalDpi xmlns:a14="http://schemas.microsoft.com/office/drawing/2010/main" val="0"/>
+                </a:ext>
+              </a:extLst>
+            </a:blip>
             <a:stretch>
               <a:fillRect/>
             </a:stretch>
@@ -12246,7 +12259,13 @@
             <a:avLst/>
           </a:prstGeom>
           <a:blipFill>
-            <a:blip r:embed="rId2"/>
+            <a:blip r:embed="rId2">
+              <a:extLst>
+                <a:ext uri="{28A0092B-C50C-407E-A947-70E740481C1C}">
+                  <a14:useLocalDpi xmlns:a14="http://schemas.microsoft.com/office/drawing/2010/main" val="0"/>
+                </a:ext>
+              </a:extLst>
+            </a:blip>
             <a:stretch>
               <a:fillRect/>
             </a:stretch>
@@ -12757,7 +12776,13 @@
             <a:avLst/>
           </a:prstGeom>
           <a:blipFill>
-            <a:blip r:embed="rId2"/>
+            <a:blip r:embed="rId2">
+              <a:extLst>
+                <a:ext uri="{28A0092B-C50C-407E-A947-70E740481C1C}">
+                  <a14:useLocalDpi xmlns:a14="http://schemas.microsoft.com/office/drawing/2010/main" val="0"/>
+                </a:ext>
+              </a:extLst>
+            </a:blip>
             <a:stretch>
               <a:fillRect/>
             </a:stretch>
@@ -13306,7 +13331,13 @@
             <a:avLst/>
           </a:prstGeom>
           <a:blipFill>
-            <a:blip r:embed="rId2"/>
+            <a:blip r:embed="rId2">
+              <a:extLst>
+                <a:ext uri="{28A0092B-C50C-407E-A947-70E740481C1C}">
+                  <a14:useLocalDpi xmlns:a14="http://schemas.microsoft.com/office/drawing/2010/main" val="0"/>
+                </a:ext>
+              </a:extLst>
+            </a:blip>
             <a:stretch>
               <a:fillRect/>
             </a:stretch>
@@ -13822,7 +13853,13 @@
             <a:avLst/>
           </a:prstGeom>
           <a:blipFill>
-            <a:blip r:embed="rId2"/>
+            <a:blip r:embed="rId2">
+              <a:extLst>
+                <a:ext uri="{28A0092B-C50C-407E-A947-70E740481C1C}">
+                  <a14:useLocalDpi xmlns:a14="http://schemas.microsoft.com/office/drawing/2010/main" val="0"/>
+                </a:ext>
+              </a:extLst>
+            </a:blip>
             <a:stretch>
               <a:fillRect/>
             </a:stretch>
@@ -14425,6 +14462,523 @@
     <p:extLst>
       <p:ext uri="{BB962C8B-B14F-4D97-AF65-F5344CB8AC3E}">
         <p14:creationId xmlns:p14="http://schemas.microsoft.com/office/powerpoint/2010/main" val="3558916819"/>
+      </p:ext>
+    </p:extLst>
+  </p:cSld>
+  <p:clrMapOvr>
+    <a:masterClrMapping/>
+  </p:clrMapOvr>
+</p:sld>
+</file>
+
+<file path=ppt/slides/slide28.xml><?xml version="1.0" encoding="utf-8"?>
+<p:sld xmlns:a="http://schemas.openxmlformats.org/drawingml/2006/main" xmlns:r="http://schemas.openxmlformats.org/officeDocument/2006/relationships" xmlns:p="http://schemas.openxmlformats.org/presentationml/2006/main">
+  <p:cSld>
+    <p:bg>
+      <p:bgPr>
+        <a:solidFill>
+          <a:schemeClr val="tx1">
+            <a:lumMod val="50000"/>
+            <a:lumOff val="50000"/>
+          </a:schemeClr>
+        </a:solidFill>
+        <a:effectLst/>
+      </p:bgPr>
+    </p:bg>
+    <p:spTree>
+      <p:nvGrpSpPr>
+        <p:cNvPr id="1" name="">
+          <a:extLst>
+            <a:ext uri="{FF2B5EF4-FFF2-40B4-BE49-F238E27FC236}">
+              <a16:creationId xmlns:a16="http://schemas.microsoft.com/office/drawing/2014/main" id="{A2807DAC-5E81-28A0-BFCB-A2E96E014489}"/>
+            </a:ext>
+          </a:extLst>
+        </p:cNvPr>
+        <p:cNvGrpSpPr/>
+        <p:nvPr/>
+      </p:nvGrpSpPr>
+      <p:grpSpPr>
+        <a:xfrm>
+          <a:off x="0" y="0"/>
+          <a:ext cx="0" cy="0"/>
+          <a:chOff x="0" y="0"/>
+          <a:chExt cx="0" cy="0"/>
+        </a:xfrm>
+      </p:grpSpPr>
+      <p:sp>
+        <p:nvSpPr>
+          <p:cNvPr id="40" name="Image">
+            <a:extLst>
+              <a:ext uri="{FF2B5EF4-FFF2-40B4-BE49-F238E27FC236}">
+                <a16:creationId xmlns:a16="http://schemas.microsoft.com/office/drawing/2014/main" id="{79C53DCD-6DFA-F947-B530-2AF819BBEE12}"/>
+              </a:ext>
+            </a:extLst>
+          </p:cNvPr>
+          <p:cNvSpPr/>
+          <p:nvPr/>
+        </p:nvSpPr>
+        <p:spPr>
+          <a:xfrm>
+            <a:off x="397476" y="337289"/>
+            <a:ext cx="4991146" cy="4991146"/>
+          </a:xfrm>
+          <a:prstGeom prst="rect">
+            <a:avLst/>
+          </a:prstGeom>
+          <a:blipFill>
+            <a:blip r:embed="rId2">
+              <a:extLst>
+                <a:ext uri="{28A0092B-C50C-407E-A947-70E740481C1C}">
+                  <a14:useLocalDpi xmlns:a14="http://schemas.microsoft.com/office/drawing/2010/main" val="0"/>
+                </a:ext>
+              </a:extLst>
+            </a:blip>
+            <a:stretch>
+              <a:fillRect/>
+            </a:stretch>
+          </a:blipFill>
+          <a:ln>
+            <a:noFill/>
+          </a:ln>
+        </p:spPr>
+        <p:style>
+          <a:lnRef idx="2">
+            <a:schemeClr val="accent6">
+              <a:shade val="15000"/>
+            </a:schemeClr>
+          </a:lnRef>
+          <a:fillRef idx="1">
+            <a:schemeClr val="accent6"/>
+          </a:fillRef>
+          <a:effectRef idx="0">
+            <a:schemeClr val="accent6"/>
+          </a:effectRef>
+          <a:fontRef idx="minor">
+            <a:schemeClr val="lt1"/>
+          </a:fontRef>
+        </p:style>
+        <p:txBody>
+          <a:bodyPr rtlCol="0" anchor="ctr"/>
+          <a:lstStyle/>
+          <a:p>
+            <a:pPr algn="ctr"/>
+            <a:endParaRPr lang="en-US"/>
+          </a:p>
+        </p:txBody>
+      </p:sp>
+      <p:sp>
+        <p:nvSpPr>
+          <p:cNvPr id="3" name="gradient">
+            <a:extLst>
+              <a:ext uri="{FF2B5EF4-FFF2-40B4-BE49-F238E27FC236}">
+                <a16:creationId xmlns:a16="http://schemas.microsoft.com/office/drawing/2014/main" id="{2015DBDD-B55A-1754-4C02-2882B7631DE3}"/>
+              </a:ext>
+            </a:extLst>
+          </p:cNvPr>
+          <p:cNvSpPr/>
+          <p:nvPr/>
+        </p:nvSpPr>
+        <p:spPr>
+          <a:xfrm>
+            <a:off x="397476" y="334161"/>
+            <a:ext cx="4991146" cy="4991146"/>
+          </a:xfrm>
+          <a:prstGeom prst="rect">
+            <a:avLst/>
+          </a:prstGeom>
+          <a:gradFill flip="none" rotWithShape="1">
+            <a:gsLst>
+              <a:gs pos="100000">
+                <a:schemeClr val="tx1">
+                  <a:alpha val="80000"/>
+                </a:schemeClr>
+              </a:gs>
+              <a:gs pos="0">
+                <a:schemeClr val="tx1">
+                  <a:alpha val="30000"/>
+                </a:schemeClr>
+              </a:gs>
+            </a:gsLst>
+            <a:lin ang="5400000" scaled="1"/>
+            <a:tileRect/>
+          </a:gradFill>
+          <a:ln>
+            <a:noFill/>
+          </a:ln>
+        </p:spPr>
+        <p:style>
+          <a:lnRef idx="2">
+            <a:schemeClr val="accent6">
+              <a:shade val="15000"/>
+            </a:schemeClr>
+          </a:lnRef>
+          <a:fillRef idx="1">
+            <a:schemeClr val="accent6"/>
+          </a:fillRef>
+          <a:effectRef idx="0">
+            <a:schemeClr val="accent6"/>
+          </a:effectRef>
+          <a:fontRef idx="minor">
+            <a:schemeClr val="lt1"/>
+          </a:fontRef>
+        </p:style>
+        <p:txBody>
+          <a:bodyPr rtlCol="0" anchor="ctr"/>
+          <a:lstStyle/>
+          <a:p>
+            <a:pPr algn="ctr"/>
+            <a:endParaRPr lang="en-US"/>
+          </a:p>
+        </p:txBody>
+      </p:sp>
+      <p:grpSp>
+        <p:nvGrpSpPr>
+          <p:cNvPr id="4" name="Overlay">
+            <a:extLst>
+              <a:ext uri="{FF2B5EF4-FFF2-40B4-BE49-F238E27FC236}">
+                <a16:creationId xmlns:a16="http://schemas.microsoft.com/office/drawing/2014/main" id="{DDC2E6CE-AE66-B1EB-2899-AF559FAAFE18}"/>
+              </a:ext>
+            </a:extLst>
+          </p:cNvPr>
+          <p:cNvGrpSpPr/>
+          <p:nvPr/>
+        </p:nvGrpSpPr>
+        <p:grpSpPr>
+          <a:xfrm>
+            <a:off x="394182" y="331033"/>
+            <a:ext cx="4991146" cy="4991146"/>
+            <a:chOff x="397476" y="337289"/>
+            <a:chExt cx="4991146" cy="4991146"/>
+          </a:xfrm>
+          <a:effectLst/>
+        </p:grpSpPr>
+        <p:pic>
+          <p:nvPicPr>
+            <p:cNvPr id="9" name="Picture 8">
+              <a:extLst>
+                <a:ext uri="{FF2B5EF4-FFF2-40B4-BE49-F238E27FC236}">
+                  <a16:creationId xmlns:a16="http://schemas.microsoft.com/office/drawing/2014/main" id="{F347E1AE-A94B-46E3-90EF-DD9B0512F6D8}"/>
+                </a:ext>
+              </a:extLst>
+            </p:cNvPr>
+            <p:cNvPicPr>
+              <a:picLocks noChangeAspect="1"/>
+            </p:cNvPicPr>
+            <p:nvPr/>
+          </p:nvPicPr>
+          <p:blipFill>
+            <a:blip r:embed="rId3">
+              <a:extLst>
+                <a:ext uri="{28A0092B-C50C-407E-A947-70E740481C1C}">
+                  <a14:useLocalDpi xmlns:a14="http://schemas.microsoft.com/office/drawing/2010/main" val="0"/>
+                </a:ext>
+              </a:extLst>
+            </a:blip>
+            <a:stretch>
+              <a:fillRect/>
+            </a:stretch>
+          </p:blipFill>
+          <p:spPr>
+            <a:xfrm>
+              <a:off x="397476" y="900020"/>
+              <a:ext cx="4991146" cy="3763166"/>
+            </a:xfrm>
+            <a:prstGeom prst="rect">
+              <a:avLst/>
+            </a:prstGeom>
+          </p:spPr>
+        </p:pic>
+        <p:sp>
+          <p:nvSpPr>
+            <p:cNvPr id="10" name="Rectangle 9">
+              <a:extLst>
+                <a:ext uri="{FF2B5EF4-FFF2-40B4-BE49-F238E27FC236}">
+                  <a16:creationId xmlns:a16="http://schemas.microsoft.com/office/drawing/2014/main" id="{385E8FAF-FCD8-F953-E0D3-B55C9FE92AA0}"/>
+                </a:ext>
+              </a:extLst>
+            </p:cNvPr>
+            <p:cNvSpPr/>
+            <p:nvPr/>
+          </p:nvSpPr>
+          <p:spPr>
+            <a:xfrm>
+              <a:off x="397476" y="337289"/>
+              <a:ext cx="4991146" cy="597656"/>
+            </a:xfrm>
+            <a:prstGeom prst="rect">
+              <a:avLst/>
+            </a:prstGeom>
+            <a:solidFill>
+              <a:schemeClr val="bg1"/>
+            </a:solidFill>
+            <a:ln>
+              <a:noFill/>
+            </a:ln>
+          </p:spPr>
+          <p:style>
+            <a:lnRef idx="2">
+              <a:schemeClr val="accent1">
+                <a:shade val="15000"/>
+              </a:schemeClr>
+            </a:lnRef>
+            <a:fillRef idx="1">
+              <a:schemeClr val="accent1"/>
+            </a:fillRef>
+            <a:effectRef idx="0">
+              <a:schemeClr val="accent1"/>
+            </a:effectRef>
+            <a:fontRef idx="minor">
+              <a:schemeClr val="lt1"/>
+            </a:fontRef>
+          </p:style>
+          <p:txBody>
+            <a:bodyPr rtlCol="0" anchor="ctr"/>
+            <a:lstStyle/>
+            <a:p>
+              <a:pPr algn="ctr"/>
+              <a:endParaRPr lang="en-US"/>
+            </a:p>
+          </p:txBody>
+        </p:sp>
+        <p:sp>
+          <p:nvSpPr>
+            <p:cNvPr id="11" name="Rectangle 10">
+              <a:extLst>
+                <a:ext uri="{FF2B5EF4-FFF2-40B4-BE49-F238E27FC236}">
+                  <a16:creationId xmlns:a16="http://schemas.microsoft.com/office/drawing/2014/main" id="{8A06E459-7AC8-95B7-0CE7-A744E47CCA7A}"/>
+                </a:ext>
+              </a:extLst>
+            </p:cNvPr>
+            <p:cNvSpPr/>
+            <p:nvPr/>
+          </p:nvSpPr>
+          <p:spPr>
+            <a:xfrm>
+              <a:off x="397476" y="4651981"/>
+              <a:ext cx="4991146" cy="676454"/>
+            </a:xfrm>
+            <a:prstGeom prst="rect">
+              <a:avLst/>
+            </a:prstGeom>
+            <a:solidFill>
+              <a:schemeClr val="bg1"/>
+            </a:solidFill>
+            <a:ln>
+              <a:noFill/>
+            </a:ln>
+          </p:spPr>
+          <p:style>
+            <a:lnRef idx="2">
+              <a:schemeClr val="accent1">
+                <a:shade val="15000"/>
+              </a:schemeClr>
+            </a:lnRef>
+            <a:fillRef idx="1">
+              <a:schemeClr val="accent1"/>
+            </a:fillRef>
+            <a:effectRef idx="0">
+              <a:schemeClr val="accent1"/>
+            </a:effectRef>
+            <a:fontRef idx="minor">
+              <a:schemeClr val="lt1"/>
+            </a:fontRef>
+          </p:style>
+          <p:txBody>
+            <a:bodyPr rtlCol="0" anchor="ctr"/>
+            <a:lstStyle/>
+            <a:p>
+              <a:pPr algn="ctr"/>
+              <a:endParaRPr lang="en-US"/>
+            </a:p>
+          </p:txBody>
+        </p:sp>
+      </p:grpSp>
+      <p:pic>
+        <p:nvPicPr>
+          <p:cNvPr id="5" name="pdf-badge">
+            <a:extLst>
+              <a:ext uri="{FF2B5EF4-FFF2-40B4-BE49-F238E27FC236}">
+                <a16:creationId xmlns:a16="http://schemas.microsoft.com/office/drawing/2014/main" id="{933963AF-4B7E-E264-3E07-7DBF63C00263}"/>
+              </a:ext>
+            </a:extLst>
+          </p:cNvPr>
+          <p:cNvPicPr>
+            <a:picLocks noChangeAspect="1"/>
+          </p:cNvPicPr>
+          <p:nvPr/>
+        </p:nvPicPr>
+        <p:blipFill>
+          <a:blip r:embed="rId4">
+            <a:extLst>
+              <a:ext uri="{28A0092B-C50C-407E-A947-70E740481C1C}">
+                <a14:useLocalDpi xmlns:a14="http://schemas.microsoft.com/office/drawing/2010/main" val="0"/>
+              </a:ext>
+            </a:extLst>
+          </a:blip>
+          <a:stretch>
+            <a:fillRect/>
+          </a:stretch>
+        </p:blipFill>
+        <p:spPr>
+          <a:xfrm>
+            <a:off x="517170" y="4497968"/>
+            <a:ext cx="673747" cy="673747"/>
+          </a:xfrm>
+          <a:prstGeom prst="rect">
+            <a:avLst/>
+          </a:prstGeom>
+        </p:spPr>
+      </p:pic>
+      <p:grpSp>
+        <p:nvGrpSpPr>
+          <p:cNvPr id="6" name="time-badge">
+            <a:extLst>
+              <a:ext uri="{FF2B5EF4-FFF2-40B4-BE49-F238E27FC236}">
+                <a16:creationId xmlns:a16="http://schemas.microsoft.com/office/drawing/2014/main" id="{7A99C323-8D41-A27D-57D8-438455810904}"/>
+              </a:ext>
+            </a:extLst>
+          </p:cNvPr>
+          <p:cNvGrpSpPr/>
+          <p:nvPr/>
+        </p:nvGrpSpPr>
+        <p:grpSpPr>
+          <a:xfrm>
+            <a:off x="4595181" y="4325971"/>
+            <a:ext cx="732054" cy="847912"/>
+            <a:chOff x="4595181" y="4325971"/>
+            <a:chExt cx="732054" cy="847912"/>
+          </a:xfrm>
+        </p:grpSpPr>
+        <p:pic>
+          <p:nvPicPr>
+            <p:cNvPr id="7" name="Picture 6">
+              <a:extLst>
+                <a:ext uri="{FF2B5EF4-FFF2-40B4-BE49-F238E27FC236}">
+                  <a16:creationId xmlns:a16="http://schemas.microsoft.com/office/drawing/2014/main" id="{EAC31DE4-18E2-6B57-D68D-CD924BAC0D96}"/>
+                </a:ext>
+              </a:extLst>
+            </p:cNvPr>
+            <p:cNvPicPr>
+              <a:picLocks noChangeAspect="1"/>
+            </p:cNvPicPr>
+            <p:nvPr/>
+          </p:nvPicPr>
+          <p:blipFill>
+            <a:blip r:embed="rId5">
+              <a:extLst>
+                <a:ext uri="{28A0092B-C50C-407E-A947-70E740481C1C}">
+                  <a14:useLocalDpi xmlns:a14="http://schemas.microsoft.com/office/drawing/2010/main" val="0"/>
+                </a:ext>
+              </a:extLst>
+            </a:blip>
+            <a:stretch>
+              <a:fillRect/>
+            </a:stretch>
+          </p:blipFill>
+          <p:spPr>
+            <a:xfrm>
+              <a:off x="4708110" y="4325971"/>
+              <a:ext cx="506195" cy="506195"/>
+            </a:xfrm>
+            <a:prstGeom prst="rect">
+              <a:avLst/>
+            </a:prstGeom>
+          </p:spPr>
+        </p:pic>
+        <p:sp>
+          <p:nvSpPr>
+            <p:cNvPr id="8" name="TextBox 7">
+              <a:extLst>
+                <a:ext uri="{FF2B5EF4-FFF2-40B4-BE49-F238E27FC236}">
+                  <a16:creationId xmlns:a16="http://schemas.microsoft.com/office/drawing/2014/main" id="{22096F3C-DBBB-A5A8-BA27-73B93D656B70}"/>
+                </a:ext>
+              </a:extLst>
+            </p:cNvPr>
+            <p:cNvSpPr txBox="1"/>
+            <p:nvPr/>
+          </p:nvSpPr>
+          <p:spPr>
+            <a:xfrm>
+              <a:off x="4595181" y="4804551"/>
+              <a:ext cx="732054" cy="369332"/>
+            </a:xfrm>
+            <a:prstGeom prst="rect">
+              <a:avLst/>
+            </a:prstGeom>
+            <a:noFill/>
+          </p:spPr>
+          <p:txBody>
+            <a:bodyPr wrap="square" rtlCol="0">
+              <a:spAutoFit/>
+            </a:bodyPr>
+            <a:lstStyle/>
+            <a:p>
+              <a:pPr algn="ctr"/>
+              <a:r>
+                <a:rPr lang="en-US" b="1" dirty="0">
+                  <a:latin typeface="Georgia" panose="02040502050405020303" pitchFamily="18" charset="0"/>
+                </a:rPr>
+                <a:t>3-4h</a:t>
+              </a:r>
+            </a:p>
+          </p:txBody>
+        </p:sp>
+      </p:grpSp>
+      <p:sp>
+        <p:nvSpPr>
+          <p:cNvPr id="2" name="title">
+            <a:extLst>
+              <a:ext uri="{FF2B5EF4-FFF2-40B4-BE49-F238E27FC236}">
+                <a16:creationId xmlns:a16="http://schemas.microsoft.com/office/drawing/2014/main" id="{27A33A63-7A72-BF80-F97F-CB96A7FD96F3}"/>
+              </a:ext>
+            </a:extLst>
+          </p:cNvPr>
+          <p:cNvSpPr txBox="1"/>
+          <p:nvPr/>
+        </p:nvSpPr>
+        <p:spPr>
+          <a:xfrm>
+            <a:off x="1442698" y="1322233"/>
+            <a:ext cx="2900702" cy="3015002"/>
+          </a:xfrm>
+          <a:prstGeom prst="rect">
+            <a:avLst/>
+          </a:prstGeom>
+          <a:noFill/>
+        </p:spPr>
+        <p:txBody>
+          <a:bodyPr wrap="square" rtlCol="0" anchor="ctr" anchorCtr="0">
+            <a:noAutofit/>
+          </a:bodyPr>
+          <a:lstStyle/>
+          <a:p>
+            <a:pPr algn="ctr"/>
+            <a:r>
+              <a:rPr lang="en-US" sz="4000" dirty="0">
+                <a:ln w="6350">
+                  <a:noFill/>
+                </a:ln>
+                <a:solidFill>
+                  <a:schemeClr val="bg1"/>
+                </a:solidFill>
+                <a:effectLst>
+                  <a:outerShdw blurRad="50800" dist="38100" dir="2700000" algn="tl" rotWithShape="0">
+                    <a:prstClr val="black">
+                      <a:alpha val="40000"/>
+                    </a:prstClr>
+                  </a:outerShdw>
+                </a:effectLst>
+                <a:latin typeface="Berkshire Swash" panose="02000505000000020003" pitchFamily="2" charset="0"/>
+              </a:rPr>
+              <a:t>Electric Dreams</a:t>
+            </a:r>
+          </a:p>
+        </p:txBody>
+      </p:sp>
+    </p:spTree>
+    <p:extLst>
+      <p:ext uri="{BB962C8B-B14F-4D97-AF65-F5344CB8AC3E}">
+        <p14:creationId xmlns:p14="http://schemas.microsoft.com/office/powerpoint/2010/main" val="2685691424"/>
       </p:ext>
     </p:extLst>
   </p:cSld>

</xml_diff>

<commit_message>
Add initial notes and update schedule and cover images in work-in-progress
</commit_message>
<xml_diff>
--- a/public/data/_work-in-progress/_share/cover-images.pptx
+++ b/public/data/_work-in-progress/_share/cover-images.pptx
@@ -286,7 +286,7 @@
           <a:p>
             <a:fld id="{F8790B07-F0DA-42FB-9B41-9B73EF6DB6A9}" type="datetimeFigureOut">
               <a:rPr lang="en-US" smtClean="0"/>
-              <a:t>3/19/2025</a:t>
+              <a:t>3/25/2025</a:t>
             </a:fld>
             <a:endParaRPr lang="en-US"/>
           </a:p>
@@ -484,7 +484,7 @@
           <a:p>
             <a:fld id="{F8790B07-F0DA-42FB-9B41-9B73EF6DB6A9}" type="datetimeFigureOut">
               <a:rPr lang="en-US" smtClean="0"/>
-              <a:t>3/19/2025</a:t>
+              <a:t>3/25/2025</a:t>
             </a:fld>
             <a:endParaRPr lang="en-US"/>
           </a:p>
@@ -692,7 +692,7 @@
           <a:p>
             <a:fld id="{F8790B07-F0DA-42FB-9B41-9B73EF6DB6A9}" type="datetimeFigureOut">
               <a:rPr lang="en-US" smtClean="0"/>
-              <a:t>3/19/2025</a:t>
+              <a:t>3/25/2025</a:t>
             </a:fld>
             <a:endParaRPr lang="en-US"/>
           </a:p>
@@ -890,7 +890,7 @@
           <a:p>
             <a:fld id="{F8790B07-F0DA-42FB-9B41-9B73EF6DB6A9}" type="datetimeFigureOut">
               <a:rPr lang="en-US" smtClean="0"/>
-              <a:t>3/19/2025</a:t>
+              <a:t>3/25/2025</a:t>
             </a:fld>
             <a:endParaRPr lang="en-US"/>
           </a:p>
@@ -1165,7 +1165,7 @@
           <a:p>
             <a:fld id="{F8790B07-F0DA-42FB-9B41-9B73EF6DB6A9}" type="datetimeFigureOut">
               <a:rPr lang="en-US" smtClean="0"/>
-              <a:t>3/19/2025</a:t>
+              <a:t>3/25/2025</a:t>
             </a:fld>
             <a:endParaRPr lang="en-US"/>
           </a:p>
@@ -1430,7 +1430,7 @@
           <a:p>
             <a:fld id="{F8790B07-F0DA-42FB-9B41-9B73EF6DB6A9}" type="datetimeFigureOut">
               <a:rPr lang="en-US" smtClean="0"/>
-              <a:t>3/19/2025</a:t>
+              <a:t>3/25/2025</a:t>
             </a:fld>
             <a:endParaRPr lang="en-US"/>
           </a:p>
@@ -1842,7 +1842,7 @@
           <a:p>
             <a:fld id="{F8790B07-F0DA-42FB-9B41-9B73EF6DB6A9}" type="datetimeFigureOut">
               <a:rPr lang="en-US" smtClean="0"/>
-              <a:t>3/19/2025</a:t>
+              <a:t>3/25/2025</a:t>
             </a:fld>
             <a:endParaRPr lang="en-US"/>
           </a:p>
@@ -1983,7 +1983,7 @@
           <a:p>
             <a:fld id="{F8790B07-F0DA-42FB-9B41-9B73EF6DB6A9}" type="datetimeFigureOut">
               <a:rPr lang="en-US" smtClean="0"/>
-              <a:t>3/19/2025</a:t>
+              <a:t>3/25/2025</a:t>
             </a:fld>
             <a:endParaRPr lang="en-US"/>
           </a:p>
@@ -2096,7 +2096,7 @@
           <a:p>
             <a:fld id="{F8790B07-F0DA-42FB-9B41-9B73EF6DB6A9}" type="datetimeFigureOut">
               <a:rPr lang="en-US" smtClean="0"/>
-              <a:t>3/19/2025</a:t>
+              <a:t>3/25/2025</a:t>
             </a:fld>
             <a:endParaRPr lang="en-US"/>
           </a:p>
@@ -2407,7 +2407,7 @@
           <a:p>
             <a:fld id="{F8790B07-F0DA-42FB-9B41-9B73EF6DB6A9}" type="datetimeFigureOut">
               <a:rPr lang="en-US" smtClean="0"/>
-              <a:t>3/19/2025</a:t>
+              <a:t>3/25/2025</a:t>
             </a:fld>
             <a:endParaRPr lang="en-US"/>
           </a:p>
@@ -2695,7 +2695,7 @@
           <a:p>
             <a:fld id="{F8790B07-F0DA-42FB-9B41-9B73EF6DB6A9}" type="datetimeFigureOut">
               <a:rPr lang="en-US" smtClean="0"/>
-              <a:t>3/19/2025</a:t>
+              <a:t>3/25/2025</a:t>
             </a:fld>
             <a:endParaRPr lang="en-US"/>
           </a:p>
@@ -2936,7 +2936,7 @@
           <a:p>
             <a:fld id="{F8790B07-F0DA-42FB-9B41-9B73EF6DB6A9}" type="datetimeFigureOut">
               <a:rPr lang="en-US" smtClean="0"/>
-              <a:t>3/19/2025</a:t>
+              <a:t>3/25/2025</a:t>
             </a:fld>
             <a:endParaRPr lang="en-US"/>
           </a:p>
@@ -10527,8 +10527,8 @@
         </p:blipFill>
         <p:spPr>
           <a:xfrm>
-            <a:off x="397476" y="331030"/>
-            <a:ext cx="4991146" cy="4991145"/>
+            <a:off x="447446" y="388620"/>
+            <a:ext cx="4895456" cy="4895456"/>
           </a:xfrm>
           <a:prstGeom prst="rect">
             <a:avLst/>

</xml_diff>